<commit_message>
Completed the Spotify API section of the writeup. Made a minor change to one of the questions.
</commit_message>
<xml_diff>
--- a/Spotipy Presentation 10.27.pptx
+++ b/Spotipy Presentation 10.27.pptx
@@ -281,7 +281,7 @@
           <a:p>
             <a:fld id="{2E169012-87EE-4DD3-8E3A-8A578A32B048}" type="datetimeFigureOut">
               <a:rPr lang="en-US" smtClean="0"/>
-              <a:t>10/24/2020</a:t>
+              <a:t>10/26/2020</a:t>
             </a:fld>
             <a:endParaRPr lang="en-US"/>
           </a:p>
@@ -479,7 +479,7 @@
           <a:p>
             <a:fld id="{2E169012-87EE-4DD3-8E3A-8A578A32B048}" type="datetimeFigureOut">
               <a:rPr lang="en-US" smtClean="0"/>
-              <a:t>10/24/2020</a:t>
+              <a:t>10/26/2020</a:t>
             </a:fld>
             <a:endParaRPr lang="en-US"/>
           </a:p>
@@ -687,7 +687,7 @@
           <a:p>
             <a:fld id="{2E169012-87EE-4DD3-8E3A-8A578A32B048}" type="datetimeFigureOut">
               <a:rPr lang="en-US" smtClean="0"/>
-              <a:t>10/24/2020</a:t>
+              <a:t>10/26/2020</a:t>
             </a:fld>
             <a:endParaRPr lang="en-US"/>
           </a:p>
@@ -885,7 +885,7 @@
           <a:p>
             <a:fld id="{2E169012-87EE-4DD3-8E3A-8A578A32B048}" type="datetimeFigureOut">
               <a:rPr lang="en-US" smtClean="0"/>
-              <a:t>10/24/2020</a:t>
+              <a:t>10/26/2020</a:t>
             </a:fld>
             <a:endParaRPr lang="en-US"/>
           </a:p>
@@ -1160,7 +1160,7 @@
           <a:p>
             <a:fld id="{2E169012-87EE-4DD3-8E3A-8A578A32B048}" type="datetimeFigureOut">
               <a:rPr lang="en-US" smtClean="0"/>
-              <a:t>10/24/2020</a:t>
+              <a:t>10/26/2020</a:t>
             </a:fld>
             <a:endParaRPr lang="en-US"/>
           </a:p>
@@ -1425,7 +1425,7 @@
           <a:p>
             <a:fld id="{2E169012-87EE-4DD3-8E3A-8A578A32B048}" type="datetimeFigureOut">
               <a:rPr lang="en-US" smtClean="0"/>
-              <a:t>10/24/2020</a:t>
+              <a:t>10/26/2020</a:t>
             </a:fld>
             <a:endParaRPr lang="en-US"/>
           </a:p>
@@ -1837,7 +1837,7 @@
           <a:p>
             <a:fld id="{2E169012-87EE-4DD3-8E3A-8A578A32B048}" type="datetimeFigureOut">
               <a:rPr lang="en-US" smtClean="0"/>
-              <a:t>10/24/2020</a:t>
+              <a:t>10/26/2020</a:t>
             </a:fld>
             <a:endParaRPr lang="en-US"/>
           </a:p>
@@ -1978,7 +1978,7 @@
           <a:p>
             <a:fld id="{2E169012-87EE-4DD3-8E3A-8A578A32B048}" type="datetimeFigureOut">
               <a:rPr lang="en-US" smtClean="0"/>
-              <a:t>10/24/2020</a:t>
+              <a:t>10/26/2020</a:t>
             </a:fld>
             <a:endParaRPr lang="en-US"/>
           </a:p>
@@ -2091,7 +2091,7 @@
           <a:p>
             <a:fld id="{2E169012-87EE-4DD3-8E3A-8A578A32B048}" type="datetimeFigureOut">
               <a:rPr lang="en-US" smtClean="0"/>
-              <a:t>10/24/2020</a:t>
+              <a:t>10/26/2020</a:t>
             </a:fld>
             <a:endParaRPr lang="en-US"/>
           </a:p>
@@ -2402,7 +2402,7 @@
           <a:p>
             <a:fld id="{2E169012-87EE-4DD3-8E3A-8A578A32B048}" type="datetimeFigureOut">
               <a:rPr lang="en-US" smtClean="0"/>
-              <a:t>10/24/2020</a:t>
+              <a:t>10/26/2020</a:t>
             </a:fld>
             <a:endParaRPr lang="en-US"/>
           </a:p>
@@ -2690,7 +2690,7 @@
           <a:p>
             <a:fld id="{2E169012-87EE-4DD3-8E3A-8A578A32B048}" type="datetimeFigureOut">
               <a:rPr lang="en-US" smtClean="0"/>
-              <a:t>10/24/2020</a:t>
+              <a:t>10/26/2020</a:t>
             </a:fld>
             <a:endParaRPr lang="en-US"/>
           </a:p>
@@ -2931,7 +2931,7 @@
           <a:p>
             <a:fld id="{2E169012-87EE-4DD3-8E3A-8A578A32B048}" type="datetimeFigureOut">
               <a:rPr lang="en-US" smtClean="0"/>
-              <a:t>10/24/2020</a:t>
+              <a:t>10/26/2020</a:t>
             </a:fld>
             <a:endParaRPr lang="en-US"/>
           </a:p>
@@ -18409,7 +18409,7 @@
                 <a:ea typeface="+mj-ea"/>
                 <a:cs typeface="+mj-cs"/>
               </a:rPr>
-              <a:t>What decade was responsible for providing the most amount of streams? </a:t>
+              <a:t>What decade, prior to 2010, was responsible for providing the most streams in 2017? </a:t>
             </a:r>
           </a:p>
           <a:p>

</xml_diff>

<commit_message>
updated slide 19 with a horizontal bar graph
</commit_message>
<xml_diff>
--- a/Spotipy Presentation 10.27.pptx
+++ b/Spotipy Presentation 10.27.pptx
@@ -281,7 +281,7 @@
           <a:p>
             <a:fld id="{2E169012-87EE-4DD3-8E3A-8A578A32B048}" type="datetimeFigureOut">
               <a:rPr lang="en-US" smtClean="0"/>
-              <a:t>10/26/2020</a:t>
+              <a:t>10/27/20</a:t>
             </a:fld>
             <a:endParaRPr lang="en-US"/>
           </a:p>
@@ -479,7 +479,7 @@
           <a:p>
             <a:fld id="{2E169012-87EE-4DD3-8E3A-8A578A32B048}" type="datetimeFigureOut">
               <a:rPr lang="en-US" smtClean="0"/>
-              <a:t>10/26/2020</a:t>
+              <a:t>10/27/20</a:t>
             </a:fld>
             <a:endParaRPr lang="en-US"/>
           </a:p>
@@ -687,7 +687,7 @@
           <a:p>
             <a:fld id="{2E169012-87EE-4DD3-8E3A-8A578A32B048}" type="datetimeFigureOut">
               <a:rPr lang="en-US" smtClean="0"/>
-              <a:t>10/26/2020</a:t>
+              <a:t>10/27/20</a:t>
             </a:fld>
             <a:endParaRPr lang="en-US"/>
           </a:p>
@@ -885,7 +885,7 @@
           <a:p>
             <a:fld id="{2E169012-87EE-4DD3-8E3A-8A578A32B048}" type="datetimeFigureOut">
               <a:rPr lang="en-US" smtClean="0"/>
-              <a:t>10/26/2020</a:t>
+              <a:t>10/27/20</a:t>
             </a:fld>
             <a:endParaRPr lang="en-US"/>
           </a:p>
@@ -1160,7 +1160,7 @@
           <a:p>
             <a:fld id="{2E169012-87EE-4DD3-8E3A-8A578A32B048}" type="datetimeFigureOut">
               <a:rPr lang="en-US" smtClean="0"/>
-              <a:t>10/26/2020</a:t>
+              <a:t>10/27/20</a:t>
             </a:fld>
             <a:endParaRPr lang="en-US"/>
           </a:p>
@@ -1425,7 +1425,7 @@
           <a:p>
             <a:fld id="{2E169012-87EE-4DD3-8E3A-8A578A32B048}" type="datetimeFigureOut">
               <a:rPr lang="en-US" smtClean="0"/>
-              <a:t>10/26/2020</a:t>
+              <a:t>10/27/20</a:t>
             </a:fld>
             <a:endParaRPr lang="en-US"/>
           </a:p>
@@ -1837,7 +1837,7 @@
           <a:p>
             <a:fld id="{2E169012-87EE-4DD3-8E3A-8A578A32B048}" type="datetimeFigureOut">
               <a:rPr lang="en-US" smtClean="0"/>
-              <a:t>10/26/2020</a:t>
+              <a:t>10/27/20</a:t>
             </a:fld>
             <a:endParaRPr lang="en-US"/>
           </a:p>
@@ -1978,7 +1978,7 @@
           <a:p>
             <a:fld id="{2E169012-87EE-4DD3-8E3A-8A578A32B048}" type="datetimeFigureOut">
               <a:rPr lang="en-US" smtClean="0"/>
-              <a:t>10/26/2020</a:t>
+              <a:t>10/27/20</a:t>
             </a:fld>
             <a:endParaRPr lang="en-US"/>
           </a:p>
@@ -2091,7 +2091,7 @@
           <a:p>
             <a:fld id="{2E169012-87EE-4DD3-8E3A-8A578A32B048}" type="datetimeFigureOut">
               <a:rPr lang="en-US" smtClean="0"/>
-              <a:t>10/26/2020</a:t>
+              <a:t>10/27/20</a:t>
             </a:fld>
             <a:endParaRPr lang="en-US"/>
           </a:p>
@@ -2402,7 +2402,7 @@
           <a:p>
             <a:fld id="{2E169012-87EE-4DD3-8E3A-8A578A32B048}" type="datetimeFigureOut">
               <a:rPr lang="en-US" smtClean="0"/>
-              <a:t>10/26/2020</a:t>
+              <a:t>10/27/20</a:t>
             </a:fld>
             <a:endParaRPr lang="en-US"/>
           </a:p>
@@ -2690,7 +2690,7 @@
           <a:p>
             <a:fld id="{2E169012-87EE-4DD3-8E3A-8A578A32B048}" type="datetimeFigureOut">
               <a:rPr lang="en-US" smtClean="0"/>
-              <a:t>10/26/2020</a:t>
+              <a:t>10/27/20</a:t>
             </a:fld>
             <a:endParaRPr lang="en-US"/>
           </a:p>
@@ -2931,7 +2931,7 @@
           <a:p>
             <a:fld id="{2E169012-87EE-4DD3-8E3A-8A578A32B048}" type="datetimeFigureOut">
               <a:rPr lang="en-US" smtClean="0"/>
-              <a:t>10/26/2020</a:t>
+              <a:t>10/27/20</a:t>
             </a:fld>
             <a:endParaRPr lang="en-US"/>
           </a:p>
@@ -13271,7 +13271,7 @@
       </p:sp>
       <p:pic>
         <p:nvPicPr>
-          <p:cNvPr id="3" name="Picture 2" descr="A picture containing chart&#10;&#10;Description automatically generated">
+          <p:cNvPr id="3" name="Picture 2">
             <a:extLst>
               <a:ext uri="{FF2B5EF4-FFF2-40B4-BE49-F238E27FC236}">
                 <a16:creationId xmlns:a16="http://schemas.microsoft.com/office/drawing/2014/main" id="{1602D7E4-A51C-4D3C-983B-7BD12F541332}"/>
@@ -13283,7 +13283,7 @@
           </p:cNvPicPr>
           <p:nvPr/>
         </p:nvPicPr>
-        <p:blipFill>
+        <p:blipFill rotWithShape="1">
           <a:blip r:embed="rId3">
             <a:extLst>
               <a:ext uri="{28A0092B-C50C-407E-A947-70E740481C1C}">
@@ -13291,84 +13291,77 @@
               </a:ext>
             </a:extLst>
           </a:blip>
-          <a:stretch>
-            <a:fillRect/>
-          </a:stretch>
+          <a:srcRect l="-855" t="-1852" r="-855" b="-1852"/>
+          <a:stretch/>
         </p:blipFill>
         <p:spPr>
           <a:xfrm>
-            <a:off x="101095" y="2092097"/>
-            <a:ext cx="7200900" cy="2823126"/>
+            <a:off x="120883" y="2148840"/>
+            <a:ext cx="7161324" cy="2560320"/>
           </a:xfrm>
           <a:custGeom>
             <a:avLst/>
             <a:gdLst>
-              <a:gd name="connsiteX0" fmla="*/ 0 w 7200900"/>
-              <a:gd name="connsiteY0" fmla="*/ 0 h 2823126"/>
-              <a:gd name="connsiteX1" fmla="*/ 438600 w 7200900"/>
-              <a:gd name="connsiteY1" fmla="*/ 0 h 2823126"/>
-              <a:gd name="connsiteX2" fmla="*/ 1021219 w 7200900"/>
-              <a:gd name="connsiteY2" fmla="*/ 0 h 2823126"/>
-              <a:gd name="connsiteX3" fmla="*/ 1603837 w 7200900"/>
-              <a:gd name="connsiteY3" fmla="*/ 0 h 2823126"/>
-              <a:gd name="connsiteX4" fmla="*/ 2186455 w 7200900"/>
-              <a:gd name="connsiteY4" fmla="*/ 0 h 2823126"/>
-              <a:gd name="connsiteX5" fmla="*/ 2769073 w 7200900"/>
-              <a:gd name="connsiteY5" fmla="*/ 0 h 2823126"/>
-              <a:gd name="connsiteX6" fmla="*/ 3495710 w 7200900"/>
-              <a:gd name="connsiteY6" fmla="*/ 0 h 2823126"/>
-              <a:gd name="connsiteX7" fmla="*/ 4078328 w 7200900"/>
-              <a:gd name="connsiteY7" fmla="*/ 0 h 2823126"/>
-              <a:gd name="connsiteX8" fmla="*/ 4732955 w 7200900"/>
-              <a:gd name="connsiteY8" fmla="*/ 0 h 2823126"/>
-              <a:gd name="connsiteX9" fmla="*/ 5531600 w 7200900"/>
-              <a:gd name="connsiteY9" fmla="*/ 0 h 2823126"/>
-              <a:gd name="connsiteX10" fmla="*/ 5970201 w 7200900"/>
-              <a:gd name="connsiteY10" fmla="*/ 0 h 2823126"/>
-              <a:gd name="connsiteX11" fmla="*/ 6552819 w 7200900"/>
-              <a:gd name="connsiteY11" fmla="*/ 0 h 2823126"/>
-              <a:gd name="connsiteX12" fmla="*/ 7200900 w 7200900"/>
-              <a:gd name="connsiteY12" fmla="*/ 0 h 2823126"/>
-              <a:gd name="connsiteX13" fmla="*/ 7200900 w 7200900"/>
-              <a:gd name="connsiteY13" fmla="*/ 564625 h 2823126"/>
-              <a:gd name="connsiteX14" fmla="*/ 7200900 w 7200900"/>
-              <a:gd name="connsiteY14" fmla="*/ 1129250 h 2823126"/>
-              <a:gd name="connsiteX15" fmla="*/ 7200900 w 7200900"/>
-              <a:gd name="connsiteY15" fmla="*/ 1665644 h 2823126"/>
-              <a:gd name="connsiteX16" fmla="*/ 7200900 w 7200900"/>
-              <a:gd name="connsiteY16" fmla="*/ 2173807 h 2823126"/>
-              <a:gd name="connsiteX17" fmla="*/ 7200900 w 7200900"/>
-              <a:gd name="connsiteY17" fmla="*/ 2823126 h 2823126"/>
-              <a:gd name="connsiteX18" fmla="*/ 6402255 w 7200900"/>
-              <a:gd name="connsiteY18" fmla="*/ 2823126 h 2823126"/>
-              <a:gd name="connsiteX19" fmla="*/ 5891645 w 7200900"/>
-              <a:gd name="connsiteY19" fmla="*/ 2823126 h 2823126"/>
-              <a:gd name="connsiteX20" fmla="*/ 5165009 w 7200900"/>
-              <a:gd name="connsiteY20" fmla="*/ 2823126 h 2823126"/>
-              <a:gd name="connsiteX21" fmla="*/ 4438373 w 7200900"/>
-              <a:gd name="connsiteY21" fmla="*/ 2823126 h 2823126"/>
-              <a:gd name="connsiteX22" fmla="*/ 3783746 w 7200900"/>
-              <a:gd name="connsiteY22" fmla="*/ 2823126 h 2823126"/>
-              <a:gd name="connsiteX23" fmla="*/ 3129118 w 7200900"/>
-              <a:gd name="connsiteY23" fmla="*/ 2823126 h 2823126"/>
-              <a:gd name="connsiteX24" fmla="*/ 2402482 w 7200900"/>
-              <a:gd name="connsiteY24" fmla="*/ 2823126 h 2823126"/>
-              <a:gd name="connsiteX25" fmla="*/ 1675846 w 7200900"/>
-              <a:gd name="connsiteY25" fmla="*/ 2823126 h 2823126"/>
-              <a:gd name="connsiteX26" fmla="*/ 877201 w 7200900"/>
-              <a:gd name="connsiteY26" fmla="*/ 2823126 h 2823126"/>
-              <a:gd name="connsiteX27" fmla="*/ 0 w 7200900"/>
-              <a:gd name="connsiteY27" fmla="*/ 2823126 h 2823126"/>
-              <a:gd name="connsiteX28" fmla="*/ 0 w 7200900"/>
-              <a:gd name="connsiteY28" fmla="*/ 2202038 h 2823126"/>
-              <a:gd name="connsiteX29" fmla="*/ 0 w 7200900"/>
-              <a:gd name="connsiteY29" fmla="*/ 1665644 h 2823126"/>
-              <a:gd name="connsiteX30" fmla="*/ 0 w 7200900"/>
-              <a:gd name="connsiteY30" fmla="*/ 1157482 h 2823126"/>
-              <a:gd name="connsiteX31" fmla="*/ 0 w 7200900"/>
-              <a:gd name="connsiteY31" fmla="*/ 649319 h 2823126"/>
-              <a:gd name="connsiteX32" fmla="*/ 0 w 7200900"/>
-              <a:gd name="connsiteY32" fmla="*/ 0 h 2823126"/>
+              <a:gd name="connsiteX0" fmla="*/ 0 w 7161324"/>
+              <a:gd name="connsiteY0" fmla="*/ 0 h 2560320"/>
+              <a:gd name="connsiteX1" fmla="*/ 794256 w 7161324"/>
+              <a:gd name="connsiteY1" fmla="*/ 0 h 2560320"/>
+              <a:gd name="connsiteX2" fmla="*/ 1588512 w 7161324"/>
+              <a:gd name="connsiteY2" fmla="*/ 0 h 2560320"/>
+              <a:gd name="connsiteX3" fmla="*/ 2096315 w 7161324"/>
+              <a:gd name="connsiteY3" fmla="*/ 0 h 2560320"/>
+              <a:gd name="connsiteX4" fmla="*/ 2675731 w 7161324"/>
+              <a:gd name="connsiteY4" fmla="*/ 0 h 2560320"/>
+              <a:gd name="connsiteX5" fmla="*/ 3255147 w 7161324"/>
+              <a:gd name="connsiteY5" fmla="*/ 0 h 2560320"/>
+              <a:gd name="connsiteX6" fmla="*/ 3834563 w 7161324"/>
+              <a:gd name="connsiteY6" fmla="*/ 0 h 2560320"/>
+              <a:gd name="connsiteX7" fmla="*/ 4413980 w 7161324"/>
+              <a:gd name="connsiteY7" fmla="*/ 0 h 2560320"/>
+              <a:gd name="connsiteX8" fmla="*/ 5136622 w 7161324"/>
+              <a:gd name="connsiteY8" fmla="*/ 0 h 2560320"/>
+              <a:gd name="connsiteX9" fmla="*/ 5716039 w 7161324"/>
+              <a:gd name="connsiteY9" fmla="*/ 0 h 2560320"/>
+              <a:gd name="connsiteX10" fmla="*/ 6367068 w 7161324"/>
+              <a:gd name="connsiteY10" fmla="*/ 0 h 2560320"/>
+              <a:gd name="connsiteX11" fmla="*/ 7161324 w 7161324"/>
+              <a:gd name="connsiteY11" fmla="*/ 0 h 2560320"/>
+              <a:gd name="connsiteX12" fmla="*/ 7161324 w 7161324"/>
+              <a:gd name="connsiteY12" fmla="*/ 563270 h 2560320"/>
+              <a:gd name="connsiteX13" fmla="*/ 7161324 w 7161324"/>
+              <a:gd name="connsiteY13" fmla="*/ 1254557 h 2560320"/>
+              <a:gd name="connsiteX14" fmla="*/ 7161324 w 7161324"/>
+              <a:gd name="connsiteY14" fmla="*/ 1843430 h 2560320"/>
+              <a:gd name="connsiteX15" fmla="*/ 7161324 w 7161324"/>
+              <a:gd name="connsiteY15" fmla="*/ 2560320 h 2560320"/>
+              <a:gd name="connsiteX16" fmla="*/ 6510295 w 7161324"/>
+              <a:gd name="connsiteY16" fmla="*/ 2560320 h 2560320"/>
+              <a:gd name="connsiteX17" fmla="*/ 5787652 w 7161324"/>
+              <a:gd name="connsiteY17" fmla="*/ 2560320 h 2560320"/>
+              <a:gd name="connsiteX18" fmla="*/ 5065009 w 7161324"/>
+              <a:gd name="connsiteY18" fmla="*/ 2560320 h 2560320"/>
+              <a:gd name="connsiteX19" fmla="*/ 4342366 w 7161324"/>
+              <a:gd name="connsiteY19" fmla="*/ 2560320 h 2560320"/>
+              <a:gd name="connsiteX20" fmla="*/ 3762950 w 7161324"/>
+              <a:gd name="connsiteY20" fmla="*/ 2560320 h 2560320"/>
+              <a:gd name="connsiteX21" fmla="*/ 3255147 w 7161324"/>
+              <a:gd name="connsiteY21" fmla="*/ 2560320 h 2560320"/>
+              <a:gd name="connsiteX22" fmla="*/ 2532505 w 7161324"/>
+              <a:gd name="connsiteY22" fmla="*/ 2560320 h 2560320"/>
+              <a:gd name="connsiteX23" fmla="*/ 1809862 w 7161324"/>
+              <a:gd name="connsiteY23" fmla="*/ 2560320 h 2560320"/>
+              <a:gd name="connsiteX24" fmla="*/ 1158832 w 7161324"/>
+              <a:gd name="connsiteY24" fmla="*/ 2560320 h 2560320"/>
+              <a:gd name="connsiteX25" fmla="*/ 0 w 7161324"/>
+              <a:gd name="connsiteY25" fmla="*/ 2560320 h 2560320"/>
+              <a:gd name="connsiteX26" fmla="*/ 0 w 7161324"/>
+              <a:gd name="connsiteY26" fmla="*/ 1894637 h 2560320"/>
+              <a:gd name="connsiteX27" fmla="*/ 0 w 7161324"/>
+              <a:gd name="connsiteY27" fmla="*/ 1228954 h 2560320"/>
+              <a:gd name="connsiteX28" fmla="*/ 0 w 7161324"/>
+              <a:gd name="connsiteY28" fmla="*/ 588874 h 2560320"/>
+              <a:gd name="connsiteX29" fmla="*/ 0 w 7161324"/>
+              <a:gd name="connsiteY29" fmla="*/ 0 h 2560320"/>
             </a:gdLst>
             <a:ahLst/>
             <a:cxnLst>
@@ -13462,341 +13455,307 @@
               <a:cxn ang="0">
                 <a:pos x="connsiteX29" y="connsiteY29"/>
               </a:cxn>
-              <a:cxn ang="0">
-                <a:pos x="connsiteX30" y="connsiteY30"/>
-              </a:cxn>
-              <a:cxn ang="0">
-                <a:pos x="connsiteX31" y="connsiteY31"/>
-              </a:cxn>
-              <a:cxn ang="0">
-                <a:pos x="connsiteX32" y="connsiteY32"/>
-              </a:cxn>
             </a:cxnLst>
             <a:rect l="l" t="t" r="r" b="b"/>
             <a:pathLst>
-              <a:path w="7200900" h="2823126" fill="none" extrusionOk="0">
+              <a:path w="7161324" h="2560320" fill="none" extrusionOk="0">
                 <a:moveTo>
                   <a:pt x="0" y="0"/>
                 </a:moveTo>
                 <a:cubicBezTo>
-                  <a:pt x="181443" y="-2759"/>
-                  <a:pt x="261350" y="-21029"/>
-                  <a:pt x="438600" y="0"/>
-                </a:cubicBezTo>
-                <a:cubicBezTo>
-                  <a:pt x="615850" y="21029"/>
-                  <a:pt x="747950" y="26830"/>
-                  <a:pt x="1021219" y="0"/>
-                </a:cubicBezTo>
-                <a:cubicBezTo>
-                  <a:pt x="1294488" y="-26830"/>
-                  <a:pt x="1317949" y="91"/>
-                  <a:pt x="1603837" y="0"/>
-                </a:cubicBezTo>
-                <a:cubicBezTo>
-                  <a:pt x="1889725" y="-91"/>
-                  <a:pt x="1953956" y="-199"/>
-                  <a:pt x="2186455" y="0"/>
-                </a:cubicBezTo>
-                <a:cubicBezTo>
-                  <a:pt x="2418954" y="199"/>
-                  <a:pt x="2621232" y="-14386"/>
-                  <a:pt x="2769073" y="0"/>
-                </a:cubicBezTo>
-                <a:cubicBezTo>
-                  <a:pt x="2916914" y="14386"/>
-                  <a:pt x="3339701" y="-9396"/>
-                  <a:pt x="3495710" y="0"/>
-                </a:cubicBezTo>
-                <a:cubicBezTo>
-                  <a:pt x="3651719" y="9396"/>
-                  <a:pt x="3833242" y="-13424"/>
-                  <a:pt x="4078328" y="0"/>
-                </a:cubicBezTo>
-                <a:cubicBezTo>
-                  <a:pt x="4323414" y="13424"/>
-                  <a:pt x="4544213" y="-7190"/>
-                  <a:pt x="4732955" y="0"/>
-                </a:cubicBezTo>
-                <a:cubicBezTo>
-                  <a:pt x="4921697" y="7190"/>
-                  <a:pt x="5359190" y="12382"/>
-                  <a:pt x="5531600" y="0"/>
-                </a:cubicBezTo>
-                <a:cubicBezTo>
-                  <a:pt x="5704010" y="-12382"/>
-                  <a:pt x="5834203" y="6982"/>
-                  <a:pt x="5970201" y="0"/>
-                </a:cubicBezTo>
-                <a:cubicBezTo>
-                  <a:pt x="6106199" y="-6982"/>
-                  <a:pt x="6387968" y="18836"/>
-                  <a:pt x="6552819" y="0"/>
-                </a:cubicBezTo>
-                <a:cubicBezTo>
-                  <a:pt x="6717670" y="-18836"/>
-                  <a:pt x="7016891" y="-21976"/>
-                  <a:pt x="7200900" y="0"/>
-                </a:cubicBezTo>
-                <a:cubicBezTo>
-                  <a:pt x="7218794" y="175835"/>
-                  <a:pt x="7200069" y="448075"/>
-                  <a:pt x="7200900" y="564625"/>
-                </a:cubicBezTo>
-                <a:cubicBezTo>
-                  <a:pt x="7201731" y="681176"/>
-                  <a:pt x="7228764" y="963803"/>
-                  <a:pt x="7200900" y="1129250"/>
-                </a:cubicBezTo>
-                <a:cubicBezTo>
-                  <a:pt x="7173036" y="1294698"/>
-                  <a:pt x="7221791" y="1489930"/>
-                  <a:pt x="7200900" y="1665644"/>
-                </a:cubicBezTo>
-                <a:cubicBezTo>
-                  <a:pt x="7180009" y="1841358"/>
-                  <a:pt x="7192472" y="1974924"/>
-                  <a:pt x="7200900" y="2173807"/>
-                </a:cubicBezTo>
-                <a:cubicBezTo>
-                  <a:pt x="7209328" y="2372690"/>
-                  <a:pt x="7199518" y="2503672"/>
-                  <a:pt x="7200900" y="2823126"/>
-                </a:cubicBezTo>
-                <a:cubicBezTo>
-                  <a:pt x="6884794" y="2804289"/>
-                  <a:pt x="6710696" y="2827446"/>
-                  <a:pt x="6402255" y="2823126"/>
-                </a:cubicBezTo>
-                <a:cubicBezTo>
-                  <a:pt x="6093814" y="2818806"/>
-                  <a:pt x="6022712" y="2844658"/>
-                  <a:pt x="5891645" y="2823126"/>
-                </a:cubicBezTo>
-                <a:cubicBezTo>
-                  <a:pt x="5760578" y="2801595"/>
-                  <a:pt x="5408776" y="2825294"/>
-                  <a:pt x="5165009" y="2823126"/>
-                </a:cubicBezTo>
-                <a:cubicBezTo>
-                  <a:pt x="4921242" y="2820958"/>
-                  <a:pt x="4677101" y="2857652"/>
-                  <a:pt x="4438373" y="2823126"/>
-                </a:cubicBezTo>
-                <a:cubicBezTo>
-                  <a:pt x="4199645" y="2788600"/>
-                  <a:pt x="4019118" y="2823847"/>
-                  <a:pt x="3783746" y="2823126"/>
-                </a:cubicBezTo>
-                <a:cubicBezTo>
-                  <a:pt x="3548374" y="2822405"/>
-                  <a:pt x="3338916" y="2835632"/>
-                  <a:pt x="3129118" y="2823126"/>
-                </a:cubicBezTo>
-                <a:cubicBezTo>
-                  <a:pt x="2919320" y="2810620"/>
-                  <a:pt x="2583192" y="2831500"/>
-                  <a:pt x="2402482" y="2823126"/>
-                </a:cubicBezTo>
-                <a:cubicBezTo>
-                  <a:pt x="2221772" y="2814752"/>
-                  <a:pt x="1872106" y="2835880"/>
-                  <a:pt x="1675846" y="2823126"/>
-                </a:cubicBezTo>
-                <a:cubicBezTo>
-                  <a:pt x="1479586" y="2810372"/>
-                  <a:pt x="1093714" y="2856281"/>
-                  <a:pt x="877201" y="2823126"/>
-                </a:cubicBezTo>
-                <a:cubicBezTo>
-                  <a:pt x="660688" y="2789971"/>
-                  <a:pt x="305077" y="2791985"/>
-                  <a:pt x="0" y="2823126"/>
-                </a:cubicBezTo>
-                <a:cubicBezTo>
-                  <a:pt x="20325" y="2583549"/>
-                  <a:pt x="17015" y="2401516"/>
-                  <a:pt x="0" y="2202038"/>
-                </a:cubicBezTo>
-                <a:cubicBezTo>
-                  <a:pt x="-17015" y="2002560"/>
-                  <a:pt x="10858" y="1884950"/>
-                  <a:pt x="0" y="1665644"/>
-                </a:cubicBezTo>
-                <a:cubicBezTo>
-                  <a:pt x="-10858" y="1446338"/>
-                  <a:pt x="20908" y="1299183"/>
-                  <a:pt x="0" y="1157482"/>
-                </a:cubicBezTo>
-                <a:cubicBezTo>
-                  <a:pt x="-20908" y="1015781"/>
-                  <a:pt x="-8333" y="804851"/>
-                  <a:pt x="0" y="649319"/>
-                </a:cubicBezTo>
-                <a:cubicBezTo>
-                  <a:pt x="8333" y="493787"/>
-                  <a:pt x="-2939" y="190799"/>
+                  <a:pt x="202305" y="35518"/>
+                  <a:pt x="398148" y="-33503"/>
+                  <a:pt x="794256" y="0"/>
+                </a:cubicBezTo>
+                <a:cubicBezTo>
+                  <a:pt x="1190364" y="33503"/>
+                  <a:pt x="1218376" y="-25278"/>
+                  <a:pt x="1588512" y="0"/>
+                </a:cubicBezTo>
+                <a:cubicBezTo>
+                  <a:pt x="1958648" y="25278"/>
+                  <a:pt x="1982835" y="19860"/>
+                  <a:pt x="2096315" y="0"/>
+                </a:cubicBezTo>
+                <a:cubicBezTo>
+                  <a:pt x="2209795" y="-19860"/>
+                  <a:pt x="2523393" y="22924"/>
+                  <a:pt x="2675731" y="0"/>
+                </a:cubicBezTo>
+                <a:cubicBezTo>
+                  <a:pt x="2828069" y="-22924"/>
+                  <a:pt x="3122921" y="8300"/>
+                  <a:pt x="3255147" y="0"/>
+                </a:cubicBezTo>
+                <a:cubicBezTo>
+                  <a:pt x="3387373" y="-8300"/>
+                  <a:pt x="3558821" y="-20238"/>
+                  <a:pt x="3834563" y="0"/>
+                </a:cubicBezTo>
+                <a:cubicBezTo>
+                  <a:pt x="4110305" y="20238"/>
+                  <a:pt x="4224420" y="-13694"/>
+                  <a:pt x="4413980" y="0"/>
+                </a:cubicBezTo>
+                <a:cubicBezTo>
+                  <a:pt x="4603540" y="13694"/>
+                  <a:pt x="4922836" y="-6681"/>
+                  <a:pt x="5136622" y="0"/>
+                </a:cubicBezTo>
+                <a:cubicBezTo>
+                  <a:pt x="5350408" y="6681"/>
+                  <a:pt x="5586251" y="-21947"/>
+                  <a:pt x="5716039" y="0"/>
+                </a:cubicBezTo>
+                <a:cubicBezTo>
+                  <a:pt x="5845827" y="21947"/>
+                  <a:pt x="6235701" y="-27446"/>
+                  <a:pt x="6367068" y="0"/>
+                </a:cubicBezTo>
+                <a:cubicBezTo>
+                  <a:pt x="6498435" y="27446"/>
+                  <a:pt x="6832013" y="9121"/>
+                  <a:pt x="7161324" y="0"/>
+                </a:cubicBezTo>
+                <a:cubicBezTo>
+                  <a:pt x="7169550" y="151322"/>
+                  <a:pt x="7174514" y="426767"/>
+                  <a:pt x="7161324" y="563270"/>
+                </a:cubicBezTo>
+                <a:cubicBezTo>
+                  <a:pt x="7148135" y="699773"/>
+                  <a:pt x="7168029" y="1082287"/>
+                  <a:pt x="7161324" y="1254557"/>
+                </a:cubicBezTo>
+                <a:cubicBezTo>
+                  <a:pt x="7154619" y="1426827"/>
+                  <a:pt x="7190085" y="1683256"/>
+                  <a:pt x="7161324" y="1843430"/>
+                </a:cubicBezTo>
+                <a:cubicBezTo>
+                  <a:pt x="7132563" y="2003604"/>
+                  <a:pt x="7167800" y="2292090"/>
+                  <a:pt x="7161324" y="2560320"/>
+                </a:cubicBezTo>
+                <a:cubicBezTo>
+                  <a:pt x="6872499" y="2588211"/>
+                  <a:pt x="6671821" y="2572037"/>
+                  <a:pt x="6510295" y="2560320"/>
+                </a:cubicBezTo>
+                <a:cubicBezTo>
+                  <a:pt x="6348769" y="2548603"/>
+                  <a:pt x="6013487" y="2536083"/>
+                  <a:pt x="5787652" y="2560320"/>
+                </a:cubicBezTo>
+                <a:cubicBezTo>
+                  <a:pt x="5561817" y="2584557"/>
+                  <a:pt x="5347194" y="2527155"/>
+                  <a:pt x="5065009" y="2560320"/>
+                </a:cubicBezTo>
+                <a:cubicBezTo>
+                  <a:pt x="4782824" y="2593485"/>
+                  <a:pt x="4588678" y="2595167"/>
+                  <a:pt x="4342366" y="2560320"/>
+                </a:cubicBezTo>
+                <a:cubicBezTo>
+                  <a:pt x="4096054" y="2525473"/>
+                  <a:pt x="3979552" y="2579365"/>
+                  <a:pt x="3762950" y="2560320"/>
+                </a:cubicBezTo>
+                <a:cubicBezTo>
+                  <a:pt x="3546348" y="2541275"/>
+                  <a:pt x="3458963" y="2573938"/>
+                  <a:pt x="3255147" y="2560320"/>
+                </a:cubicBezTo>
+                <a:cubicBezTo>
+                  <a:pt x="3051331" y="2546702"/>
+                  <a:pt x="2872125" y="2579863"/>
+                  <a:pt x="2532505" y="2560320"/>
+                </a:cubicBezTo>
+                <a:cubicBezTo>
+                  <a:pt x="2192885" y="2540777"/>
+                  <a:pt x="2160242" y="2587860"/>
+                  <a:pt x="1809862" y="2560320"/>
+                </a:cubicBezTo>
+                <a:cubicBezTo>
+                  <a:pt x="1459482" y="2532780"/>
+                  <a:pt x="1469682" y="2589216"/>
+                  <a:pt x="1158832" y="2560320"/>
+                </a:cubicBezTo>
+                <a:cubicBezTo>
+                  <a:pt x="847982" y="2531425"/>
+                  <a:pt x="255548" y="2513714"/>
+                  <a:pt x="0" y="2560320"/>
+                </a:cubicBezTo>
+                <a:cubicBezTo>
+                  <a:pt x="-19072" y="2227913"/>
+                  <a:pt x="31044" y="2172715"/>
+                  <a:pt x="0" y="1894637"/>
+                </a:cubicBezTo>
+                <a:cubicBezTo>
+                  <a:pt x="-31044" y="1616559"/>
+                  <a:pt x="11360" y="1459708"/>
+                  <a:pt x="0" y="1228954"/>
+                </a:cubicBezTo>
+                <a:cubicBezTo>
+                  <a:pt x="-11360" y="998200"/>
+                  <a:pt x="28097" y="835399"/>
+                  <a:pt x="0" y="588874"/>
+                </a:cubicBezTo>
+                <a:cubicBezTo>
+                  <a:pt x="-28097" y="342349"/>
+                  <a:pt x="-11627" y="292997"/>
                   <a:pt x="0" y="0"/>
                 </a:cubicBezTo>
                 <a:close/>
               </a:path>
-              <a:path w="7200900" h="2823126" stroke="0" extrusionOk="0">
+              <a:path w="7161324" h="2560320" stroke="0" extrusionOk="0">
                 <a:moveTo>
                   <a:pt x="0" y="0"/>
                 </a:moveTo>
                 <a:cubicBezTo>
-                  <a:pt x="224301" y="19623"/>
-                  <a:pt x="447624" y="-20529"/>
-                  <a:pt x="582618" y="0"/>
-                </a:cubicBezTo>
-                <a:cubicBezTo>
-                  <a:pt x="717612" y="20529"/>
-                  <a:pt x="1071977" y="-10816"/>
-                  <a:pt x="1309255" y="0"/>
-                </a:cubicBezTo>
-                <a:cubicBezTo>
-                  <a:pt x="1546533" y="10816"/>
-                  <a:pt x="1707001" y="-11782"/>
-                  <a:pt x="1963882" y="0"/>
-                </a:cubicBezTo>
-                <a:cubicBezTo>
-                  <a:pt x="2220763" y="11782"/>
-                  <a:pt x="2411286" y="7340"/>
-                  <a:pt x="2762527" y="0"/>
-                </a:cubicBezTo>
-                <a:cubicBezTo>
-                  <a:pt x="3113768" y="-7340"/>
-                  <a:pt x="3096345" y="-10376"/>
-                  <a:pt x="3417154" y="0"/>
-                </a:cubicBezTo>
-                <a:cubicBezTo>
-                  <a:pt x="3737963" y="10376"/>
-                  <a:pt x="3737791" y="-11392"/>
-                  <a:pt x="3855755" y="0"/>
-                </a:cubicBezTo>
-                <a:cubicBezTo>
-                  <a:pt x="3973719" y="11392"/>
-                  <a:pt x="4220447" y="26213"/>
-                  <a:pt x="4582391" y="0"/>
-                </a:cubicBezTo>
-                <a:cubicBezTo>
-                  <a:pt x="4944335" y="-26213"/>
-                  <a:pt x="5105564" y="-32453"/>
-                  <a:pt x="5237018" y="0"/>
-                </a:cubicBezTo>
-                <a:cubicBezTo>
-                  <a:pt x="5368472" y="32453"/>
-                  <a:pt x="5709977" y="-33935"/>
-                  <a:pt x="6035663" y="0"/>
-                </a:cubicBezTo>
-                <a:cubicBezTo>
-                  <a:pt x="6361349" y="33935"/>
-                  <a:pt x="6927655" y="-1671"/>
-                  <a:pt x="7200900" y="0"/>
-                </a:cubicBezTo>
-                <a:cubicBezTo>
-                  <a:pt x="7218261" y="192985"/>
-                  <a:pt x="7218921" y="355673"/>
-                  <a:pt x="7200900" y="621088"/>
-                </a:cubicBezTo>
-                <a:cubicBezTo>
-                  <a:pt x="7182879" y="886503"/>
-                  <a:pt x="7226008" y="1000267"/>
-                  <a:pt x="7200900" y="1157482"/>
-                </a:cubicBezTo>
-                <a:cubicBezTo>
-                  <a:pt x="7175792" y="1314697"/>
-                  <a:pt x="7179035" y="1560244"/>
-                  <a:pt x="7200900" y="1778569"/>
-                </a:cubicBezTo>
-                <a:cubicBezTo>
-                  <a:pt x="7222765" y="1996894"/>
-                  <a:pt x="7179951" y="2037141"/>
-                  <a:pt x="7200900" y="2258501"/>
-                </a:cubicBezTo>
-                <a:cubicBezTo>
-                  <a:pt x="7221849" y="2479861"/>
-                  <a:pt x="7190041" y="2592507"/>
-                  <a:pt x="7200900" y="2823126"/>
-                </a:cubicBezTo>
-                <a:cubicBezTo>
-                  <a:pt x="7041104" y="2838110"/>
-                  <a:pt x="6815086" y="2849223"/>
-                  <a:pt x="6618282" y="2823126"/>
-                </a:cubicBezTo>
-                <a:cubicBezTo>
-                  <a:pt x="6421478" y="2797029"/>
-                  <a:pt x="6319459" y="2836893"/>
-                  <a:pt x="6179681" y="2823126"/>
-                </a:cubicBezTo>
-                <a:cubicBezTo>
-                  <a:pt x="6039903" y="2809359"/>
-                  <a:pt x="5671248" y="2859101"/>
-                  <a:pt x="5453045" y="2823126"/>
-                </a:cubicBezTo>
-                <a:cubicBezTo>
-                  <a:pt x="5234842" y="2787151"/>
-                  <a:pt x="4992426" y="2844758"/>
-                  <a:pt x="4870427" y="2823126"/>
-                </a:cubicBezTo>
-                <a:cubicBezTo>
-                  <a:pt x="4748428" y="2801494"/>
-                  <a:pt x="4568418" y="2842328"/>
-                  <a:pt x="4431827" y="2823126"/>
-                </a:cubicBezTo>
-                <a:cubicBezTo>
-                  <a:pt x="4295236" y="2803924"/>
-                  <a:pt x="3912369" y="2843563"/>
-                  <a:pt x="3633181" y="2823126"/>
-                </a:cubicBezTo>
-                <a:cubicBezTo>
-                  <a:pt x="3353993" y="2802689"/>
-                  <a:pt x="3254111" y="2841376"/>
-                  <a:pt x="2978554" y="2823126"/>
-                </a:cubicBezTo>
-                <a:cubicBezTo>
-                  <a:pt x="2702997" y="2804876"/>
-                  <a:pt x="2546200" y="2825048"/>
-                  <a:pt x="2179909" y="2823126"/>
-                </a:cubicBezTo>
-                <a:cubicBezTo>
-                  <a:pt x="1813619" y="2821204"/>
-                  <a:pt x="1672248" y="2824464"/>
-                  <a:pt x="1453273" y="2823126"/>
-                </a:cubicBezTo>
-                <a:cubicBezTo>
-                  <a:pt x="1234298" y="2821788"/>
-                  <a:pt x="1012618" y="2803279"/>
-                  <a:pt x="798645" y="2823126"/>
-                </a:cubicBezTo>
-                <a:cubicBezTo>
-                  <a:pt x="584672" y="2842973"/>
-                  <a:pt x="258302" y="2861178"/>
-                  <a:pt x="0" y="2823126"/>
-                </a:cubicBezTo>
-                <a:cubicBezTo>
-                  <a:pt x="3974" y="2561896"/>
-                  <a:pt x="25078" y="2414844"/>
-                  <a:pt x="0" y="2286732"/>
-                </a:cubicBezTo>
-                <a:cubicBezTo>
-                  <a:pt x="-25078" y="2158620"/>
-                  <a:pt x="-11963" y="2004217"/>
-                  <a:pt x="0" y="1806801"/>
-                </a:cubicBezTo>
-                <a:cubicBezTo>
-                  <a:pt x="11963" y="1609385"/>
-                  <a:pt x="17830" y="1469618"/>
-                  <a:pt x="0" y="1185713"/>
-                </a:cubicBezTo>
-                <a:cubicBezTo>
-                  <a:pt x="-17830" y="901808"/>
-                  <a:pt x="-8255" y="780894"/>
-                  <a:pt x="0" y="564625"/>
-                </a:cubicBezTo>
-                <a:cubicBezTo>
-                  <a:pt x="8255" y="348356"/>
-                  <a:pt x="-16453" y="124699"/>
+                  <a:pt x="232359" y="16465"/>
+                  <a:pt x="345844" y="-26670"/>
+                  <a:pt x="579416" y="0"/>
+                </a:cubicBezTo>
+                <a:cubicBezTo>
+                  <a:pt x="812988" y="26670"/>
+                  <a:pt x="1036787" y="13323"/>
+                  <a:pt x="1302059" y="0"/>
+                </a:cubicBezTo>
+                <a:cubicBezTo>
+                  <a:pt x="1567331" y="-13323"/>
+                  <a:pt x="1784666" y="17419"/>
+                  <a:pt x="1953088" y="0"/>
+                </a:cubicBezTo>
+                <a:cubicBezTo>
+                  <a:pt x="2121510" y="-17419"/>
+                  <a:pt x="2424917" y="17013"/>
+                  <a:pt x="2747344" y="0"/>
+                </a:cubicBezTo>
+                <a:cubicBezTo>
+                  <a:pt x="3069771" y="-17013"/>
+                  <a:pt x="3072931" y="26691"/>
+                  <a:pt x="3398374" y="0"/>
+                </a:cubicBezTo>
+                <a:cubicBezTo>
+                  <a:pt x="3723817" y="-26691"/>
+                  <a:pt x="3688325" y="18737"/>
+                  <a:pt x="3834563" y="0"/>
+                </a:cubicBezTo>
+                <a:cubicBezTo>
+                  <a:pt x="3980801" y="-18737"/>
+                  <a:pt x="4349964" y="25193"/>
+                  <a:pt x="4557206" y="0"/>
+                </a:cubicBezTo>
+                <a:cubicBezTo>
+                  <a:pt x="4764448" y="-25193"/>
+                  <a:pt x="4913847" y="-4602"/>
+                  <a:pt x="5208236" y="0"/>
+                </a:cubicBezTo>
+                <a:cubicBezTo>
+                  <a:pt x="5502625" y="4602"/>
+                  <a:pt x="5715719" y="-19320"/>
+                  <a:pt x="6002492" y="0"/>
+                </a:cubicBezTo>
+                <a:cubicBezTo>
+                  <a:pt x="6289265" y="19320"/>
+                  <a:pt x="6797896" y="-8700"/>
+                  <a:pt x="7161324" y="0"/>
+                </a:cubicBezTo>
+                <a:cubicBezTo>
+                  <a:pt x="7190508" y="138562"/>
+                  <a:pt x="7187296" y="541608"/>
+                  <a:pt x="7161324" y="691286"/>
+                </a:cubicBezTo>
+                <a:cubicBezTo>
+                  <a:pt x="7135352" y="840964"/>
+                  <a:pt x="7135694" y="1111546"/>
+                  <a:pt x="7161324" y="1305763"/>
+                </a:cubicBezTo>
+                <a:cubicBezTo>
+                  <a:pt x="7186954" y="1499980"/>
+                  <a:pt x="7156732" y="1809433"/>
+                  <a:pt x="7161324" y="1997050"/>
+                </a:cubicBezTo>
+                <a:cubicBezTo>
+                  <a:pt x="7165916" y="2184667"/>
+                  <a:pt x="7175922" y="2389426"/>
+                  <a:pt x="7161324" y="2560320"/>
+                </a:cubicBezTo>
+                <a:cubicBezTo>
+                  <a:pt x="6970563" y="2550863"/>
+                  <a:pt x="6715694" y="2553346"/>
+                  <a:pt x="6367068" y="2560320"/>
+                </a:cubicBezTo>
+                <a:cubicBezTo>
+                  <a:pt x="6018442" y="2567294"/>
+                  <a:pt x="6046877" y="2535493"/>
+                  <a:pt x="5859265" y="2560320"/>
+                </a:cubicBezTo>
+                <a:cubicBezTo>
+                  <a:pt x="5671653" y="2585147"/>
+                  <a:pt x="5572401" y="2581057"/>
+                  <a:pt x="5423075" y="2560320"/>
+                </a:cubicBezTo>
+                <a:cubicBezTo>
+                  <a:pt x="5273749" y="2539584"/>
+                  <a:pt x="5011807" y="2546731"/>
+                  <a:pt x="4700433" y="2560320"/>
+                </a:cubicBezTo>
+                <a:cubicBezTo>
+                  <a:pt x="4389059" y="2573909"/>
+                  <a:pt x="4371574" y="2568528"/>
+                  <a:pt x="4121016" y="2560320"/>
+                </a:cubicBezTo>
+                <a:cubicBezTo>
+                  <a:pt x="3870458" y="2552112"/>
+                  <a:pt x="3808260" y="2552916"/>
+                  <a:pt x="3684827" y="2560320"/>
+                </a:cubicBezTo>
+                <a:cubicBezTo>
+                  <a:pt x="3561394" y="2567724"/>
+                  <a:pt x="3254469" y="2555166"/>
+                  <a:pt x="2890571" y="2560320"/>
+                </a:cubicBezTo>
+                <a:cubicBezTo>
+                  <a:pt x="2526673" y="2565474"/>
+                  <a:pt x="2466082" y="2575809"/>
+                  <a:pt x="2239541" y="2560320"/>
+                </a:cubicBezTo>
+                <a:cubicBezTo>
+                  <a:pt x="2013000" y="2544832"/>
+                  <a:pt x="1718678" y="2579560"/>
+                  <a:pt x="1445285" y="2560320"/>
+                </a:cubicBezTo>
+                <a:cubicBezTo>
+                  <a:pt x="1171892" y="2541080"/>
+                  <a:pt x="924184" y="2565026"/>
+                  <a:pt x="722643" y="2560320"/>
+                </a:cubicBezTo>
+                <a:cubicBezTo>
+                  <a:pt x="521102" y="2555614"/>
+                  <a:pt x="342387" y="2528227"/>
+                  <a:pt x="0" y="2560320"/>
+                </a:cubicBezTo>
+                <a:cubicBezTo>
+                  <a:pt x="11069" y="2292163"/>
+                  <a:pt x="-7801" y="2200119"/>
+                  <a:pt x="0" y="1894637"/>
+                </a:cubicBezTo>
+                <a:cubicBezTo>
+                  <a:pt x="7801" y="1589155"/>
+                  <a:pt x="11822" y="1371458"/>
+                  <a:pt x="0" y="1203350"/>
+                </a:cubicBezTo>
+                <a:cubicBezTo>
+                  <a:pt x="-11822" y="1035242"/>
+                  <a:pt x="-8903" y="904683"/>
+                  <a:pt x="0" y="640080"/>
+                </a:cubicBezTo>
+                <a:cubicBezTo>
+                  <a:pt x="8903" y="375477"/>
+                  <a:pt x="-21622" y="173855"/>
                   <a:pt x="0" y="0"/>
                 </a:cubicBezTo>
                 <a:close/>

</xml_diff>